<commit_message>
moving and changing stuff
</commit_message>
<xml_diff>
--- a/IDPA/Nordstrom's Half-Yearly Havoc.pptx
+++ b/IDPA/Nordstrom's Half-Yearly Havoc.pptx
@@ -336,7 +336,7 @@
               <a:pPr>
                 <a:defRPr/>
               </a:pPr>
-              <a:t>10.09.2018</a:t>
+              <a:t>02.12.2019</a:t>
             </a:fld>
             <a:endParaRPr lang="en-US"/>
           </a:p>
@@ -4227,14 +4227,14 @@
           <p:nvPr>
             <p:extLst>
               <p:ext uri="{D42A27DB-BD31-4B8C-83A1-F6EECF244321}">
-                <p14:modId xmlns:p14="http://schemas.microsoft.com/office/powerpoint/2010/main" val="1543315950"/>
+                <p14:modId xmlns:p14="http://schemas.microsoft.com/office/powerpoint/2010/main" val="894206333"/>
               </p:ext>
             </p:extLst>
           </p:nvPr>
         </p:nvGraphicFramePr>
         <p:xfrm>
           <a:off x="152400" y="152400"/>
-          <a:ext cx="7010400" cy="4069916"/>
+          <a:ext cx="7010400" cy="3657600"/>
         </p:xfrm>
         <a:graphic>
           <a:graphicData uri="http://schemas.openxmlformats.org/drawingml/2006/table">
@@ -4374,28 +4374,37 @@
                           <a:latin typeface="Arial" charset="0"/>
                           <a:cs typeface="Times New Roman" charset="0"/>
                         </a:rPr>
-                        <a:t>Renton Fish and Game</a:t>
+                        <a:t>Renton Fish </a:t>
                       </a:r>
-                    </a:p>
-                    <a:p>
-                      <a:pPr marL="0" marR="0" lvl="0" indent="0" algn="ctr" defTabSz="966788" rtl="0" eaLnBrk="1" fontAlgn="base" latinLnBrk="0" hangingPunct="1">
-                        <a:lnSpc>
-                          <a:spcPct val="100000"/>
-                        </a:lnSpc>
-                        <a:spcBef>
-                          <a:spcPct val="20000"/>
-                        </a:spcBef>
-                        <a:spcAft>
-                          <a:spcPct val="0"/>
-                        </a:spcAft>
-                        <a:buClrTx/>
-                        <a:buSzTx/>
-                        <a:buFontTx/>
-                        <a:buNone/>
-                        <a:tabLst/>
-                      </a:pPr>
                       <a:r>
-                        <a:rPr kumimoji="0" lang="en-US" sz="1200" b="1" i="0" u="none" strike="noStrike" cap="none" normalizeH="0" baseline="0" dirty="0">
+                        <a:rPr kumimoji="0" lang="en-US" sz="1200" b="1" i="0" u="none" strike="noStrike" cap="none" normalizeH="0" baseline="0">
+                          <a:ln>
+                            <a:noFill/>
+                          </a:ln>
+                          <a:solidFill>
+                            <a:schemeClr val="tx1"/>
+                          </a:solidFill>
+                          <a:effectLst/>
+                          <a:latin typeface="Arial" charset="0"/>
+                          <a:cs typeface="Times New Roman" charset="0"/>
+                        </a:rPr>
+                        <a:t>and Game</a:t>
+                      </a:r>
+                      <a:br>
+                        <a:rPr kumimoji="0" lang="en-US" sz="1200" b="1" i="0" u="none" strike="noStrike" cap="none" normalizeH="0" baseline="0">
+                          <a:ln>
+                            <a:noFill/>
+                          </a:ln>
+                          <a:solidFill>
+                            <a:schemeClr val="tx1"/>
+                          </a:solidFill>
+                          <a:effectLst/>
+                          <a:latin typeface="Arial" charset="0"/>
+                          <a:cs typeface="Times New Roman" charset="0"/>
+                        </a:rPr>
+                      </a:br>
+                      <a:r>
+                        <a:rPr kumimoji="0" lang="en-US" sz="1200" b="1" i="0" u="none" strike="noStrike" cap="none" normalizeH="0" baseline="0">
                           <a:ln>
                             <a:noFill/>
                           </a:ln>
@@ -4408,24 +4417,34 @@
                         </a:rPr>
                         <a:t>Bay 6</a:t>
                       </a:r>
-                    </a:p>
-                    <a:p>
-                      <a:pPr marL="0" marR="0" lvl="0" indent="0" algn="ctr" defTabSz="966788" rtl="0" eaLnBrk="1" fontAlgn="base" latinLnBrk="0" hangingPunct="1">
-                        <a:lnSpc>
-                          <a:spcPct val="100000"/>
-                        </a:lnSpc>
-                        <a:spcBef>
-                          <a:spcPct val="20000"/>
-                        </a:spcBef>
-                        <a:spcAft>
-                          <a:spcPct val="0"/>
-                        </a:spcAft>
-                        <a:buClrTx/>
-                        <a:buSzTx/>
-                        <a:buFontTx/>
-                        <a:buNone/>
-                        <a:tabLst/>
-                      </a:pPr>
+                      <a:br>
+                        <a:rPr kumimoji="0" lang="en-US" sz="1200" b="1" i="0" u="none" strike="noStrike" cap="none" normalizeH="0" baseline="0">
+                          <a:ln>
+                            <a:noFill/>
+                          </a:ln>
+                          <a:solidFill>
+                            <a:schemeClr val="tx1"/>
+                          </a:solidFill>
+                          <a:effectLst/>
+                          <a:latin typeface="Arial" charset="0"/>
+                          <a:cs typeface="Times New Roman" charset="0"/>
+                        </a:rPr>
+                      </a:br>
+                      <a:r>
+                        <a:rPr kumimoji="0" lang="en-US" sz="1200" b="1" i="0" u="none" strike="noStrike" kern="1200" cap="none" normalizeH="0" baseline="0">
+                          <a:ln>
+                            <a:noFill/>
+                          </a:ln>
+                          <a:solidFill>
+                            <a:schemeClr val="tx1"/>
+                          </a:solidFill>
+                          <a:effectLst/>
+                          <a:latin typeface="Arial" charset="0"/>
+                          <a:ea typeface="+mn-ea"/>
+                          <a:cs typeface="+mn-cs"/>
+                        </a:rPr>
+                        <a:t>Stage</a:t>
+                      </a:r>
                       <a:r>
                         <a:rPr kumimoji="0" lang="en-US" sz="1200" b="1" i="0" u="none" strike="noStrike" kern="1200" cap="none" normalizeH="0" baseline="0" dirty="0">
                           <a:ln>
@@ -4439,28 +4458,39 @@
                           <a:ea typeface="+mn-ea"/>
                           <a:cs typeface="+mn-cs"/>
                         </a:rPr>
-                        <a:t>Stage: Nordstrom’s Half-Yearly Havoc</a:t>
+                        <a:t>: Nordstrom’s </a:t>
                       </a:r>
-                    </a:p>
-                    <a:p>
-                      <a:pPr marL="0" marR="0" lvl="0" indent="0" algn="ctr" defTabSz="966788" rtl="0" eaLnBrk="1" fontAlgn="base" latinLnBrk="0" hangingPunct="1">
-                        <a:lnSpc>
-                          <a:spcPct val="100000"/>
-                        </a:lnSpc>
-                        <a:spcBef>
-                          <a:spcPct val="35000"/>
-                        </a:spcBef>
-                        <a:spcAft>
-                          <a:spcPct val="0"/>
-                        </a:spcAft>
-                        <a:buClrTx/>
-                        <a:buSzTx/>
-                        <a:buFontTx/>
-                        <a:buNone/>
-                        <a:tabLst/>
-                      </a:pPr>
                       <a:r>
-                        <a:rPr kumimoji="0" lang="en-US" sz="1200" b="1" i="0" u="none" strike="noStrike" kern="1200" cap="none" normalizeH="0" baseline="0" dirty="0">
+                        <a:rPr kumimoji="0" lang="en-US" sz="1200" b="1" i="0" u="none" strike="noStrike" kern="1200" cap="none" normalizeH="0" baseline="0">
+                          <a:ln>
+                            <a:noFill/>
+                          </a:ln>
+                          <a:solidFill>
+                            <a:schemeClr val="tx1"/>
+                          </a:solidFill>
+                          <a:effectLst/>
+                          <a:latin typeface="Arial" charset="0"/>
+                          <a:ea typeface="+mn-ea"/>
+                          <a:cs typeface="+mn-cs"/>
+                        </a:rPr>
+                        <a:t>Half-Yearly Havoc</a:t>
+                      </a:r>
+                      <a:br>
+                        <a:rPr kumimoji="0" lang="en-US" sz="1200" b="1" i="0" u="none" strike="noStrike" kern="1200" cap="none" normalizeH="0" baseline="0">
+                          <a:ln>
+                            <a:noFill/>
+                          </a:ln>
+                          <a:solidFill>
+                            <a:schemeClr val="tx1"/>
+                          </a:solidFill>
+                          <a:effectLst/>
+                          <a:latin typeface="Arial" charset="0"/>
+                          <a:ea typeface="+mn-ea"/>
+                          <a:cs typeface="+mn-cs"/>
+                        </a:rPr>
+                      </a:br>
+                      <a:r>
+                        <a:rPr kumimoji="0" lang="en-US" sz="1200" b="1" i="0" u="none" strike="noStrike" kern="1200" cap="none" normalizeH="0" baseline="0">
                           <a:ln>
                             <a:noFill/>
                           </a:ln>
@@ -4475,6 +4505,19 @@
                         <a:t>C</a:t>
                       </a:r>
                       <a:r>
+                        <a:rPr kumimoji="0" lang="en-US" sz="1200" b="1" i="0" u="none" strike="noStrike" cap="none" normalizeH="0" baseline="0">
+                          <a:ln>
+                            <a:noFill/>
+                          </a:ln>
+                          <a:solidFill>
+                            <a:schemeClr val="tx1"/>
+                          </a:solidFill>
+                          <a:effectLst/>
+                          <a:latin typeface="Arial" charset="0"/>
+                        </a:rPr>
+                        <a:t>ourse </a:t>
+                      </a:r>
+                      <a:r>
                         <a:rPr kumimoji="0" lang="en-US" sz="1200" b="1" i="0" u="none" strike="noStrike" cap="none" normalizeH="0" baseline="0" dirty="0">
                           <a:ln>
                             <a:noFill/>
@@ -4485,8 +4528,31 @@
                           <a:effectLst/>
                           <a:latin typeface="Arial" charset="0"/>
                         </a:rPr>
-                        <a:t>ourse Designer: Corgi Nation Pistol Team</a:t>
+                        <a:t>Designer: Corgi Nation </a:t>
                       </a:r>
+                      <a:r>
+                        <a:rPr kumimoji="0" lang="en-US" sz="1200" b="1" i="0" u="none" strike="noStrike" cap="none" normalizeH="0" baseline="0">
+                          <a:ln>
+                            <a:noFill/>
+                          </a:ln>
+                          <a:solidFill>
+                            <a:schemeClr val="tx1"/>
+                          </a:solidFill>
+                          <a:effectLst/>
+                          <a:latin typeface="Arial" charset="0"/>
+                        </a:rPr>
+                        <a:t>Pistol Team</a:t>
+                      </a:r>
+                      <a:endParaRPr kumimoji="0" lang="en-US" sz="1200" b="1" i="0" u="none" strike="noStrike" cap="none" normalizeH="0" baseline="0" dirty="0">
+                        <a:ln>
+                          <a:noFill/>
+                        </a:ln>
+                        <a:solidFill>
+                          <a:schemeClr val="tx1"/>
+                        </a:solidFill>
+                        <a:effectLst/>
+                        <a:latin typeface="Arial" charset="0"/>
+                      </a:endParaRPr>
                     </a:p>
                   </a:txBody>
                   <a:tcPr marL="45720" marR="45720" marT="45715" marB="45715" anchor="ctr" horzOverflow="overflow">
@@ -4658,7 +4724,22 @@
                           <a:ea typeface="ＭＳ Ｐゴシック" pitchFamily="-112" charset="-128"/>
                           <a:cs typeface="Times New Roman" pitchFamily="-112" charset="0"/>
                         </a:rPr>
-                        <a:t>SCENARIO: You are shoe shopping at the Nordstrom’s Half-Yearly sale when you find the perfect pair of</a:t>
+                        <a:t>SCENARIO: </a:t>
+                      </a:r>
+                      <a:r>
+                        <a:rPr kumimoji="0" lang="en-US" sz="1100" b="0" i="0" u="none" strike="noStrike" cap="none" normalizeH="0" baseline="0" dirty="0">
+                          <a:ln>
+                            <a:noFill/>
+                          </a:ln>
+                          <a:solidFill>
+                            <a:schemeClr val="tx1"/>
+                          </a:solidFill>
+                          <a:effectLst/>
+                          <a:latin typeface="Arial" charset="0"/>
+                          <a:ea typeface="ＭＳ Ｐゴシック" pitchFamily="-112" charset="-128"/>
+                          <a:cs typeface="Times New Roman" pitchFamily="-112" charset="0"/>
+                        </a:rPr>
+                        <a:t>You are shoe shopping at the Nordstrom’s Half-Yearly sale when you find the perfect pair of</a:t>
                       </a:r>
                     </a:p>
                     <a:p>
@@ -4679,7 +4760,7 @@
                         <a:tabLst/>
                       </a:pPr>
                       <a:r>
-                        <a:rPr kumimoji="0" lang="en-US" sz="1100" b="1" i="0" u="none" strike="noStrike" cap="none" normalizeH="0" baseline="0" dirty="0">
+                        <a:rPr kumimoji="0" lang="en-US" sz="1100" b="0" i="0" u="none" strike="noStrike" cap="none" normalizeH="0" baseline="0" dirty="0">
                           <a:ln>
                             <a:noFill/>
                           </a:ln>
@@ -4712,7 +4793,7 @@
                         <a:tabLst/>
                       </a:pPr>
                       <a:r>
-                        <a:rPr kumimoji="0" lang="en-US" sz="1100" b="1" i="0" u="none" strike="noStrike" cap="none" normalizeH="0" baseline="0" dirty="0">
+                        <a:rPr kumimoji="0" lang="en-US" sz="1100" b="0" i="0" u="none" strike="noStrike" cap="none" normalizeH="0" baseline="0" dirty="0">
                           <a:ln>
                             <a:noFill/>
                           </a:ln>
@@ -4847,7 +4928,55 @@
                           <a:ea typeface="ＭＳ Ｐゴシック" pitchFamily="-112" charset="-128"/>
                           <a:cs typeface="Times New Roman" pitchFamily="-112" charset="0"/>
                         </a:rPr>
-                        <a:t>START POSITION: Standing at P1, gun loaded and holstered. Each Hand is holding one shoe and held at eye level (because you are admiring them)</a:t>
+                        <a:t>START POSITION: </a:t>
+                      </a:r>
+                      <a:r>
+                        <a:rPr kumimoji="0" lang="en-US" sz="1100" b="0" i="0" u="none" strike="noStrike" cap="none" normalizeH="0" baseline="0" dirty="0">
+                          <a:ln>
+                            <a:noFill/>
+                          </a:ln>
+                          <a:solidFill>
+                            <a:schemeClr val="tx1"/>
+                          </a:solidFill>
+                          <a:effectLst/>
+                          <a:latin typeface="Arial" charset="0"/>
+                          <a:ea typeface="ＭＳ Ｐゴシック" pitchFamily="-112" charset="-128"/>
+                          <a:cs typeface="Times New Roman" pitchFamily="-112" charset="0"/>
+                        </a:rPr>
+                        <a:t>Standing at P1, gun loaded and holstered. Each Hand is holding one shoe and held at eye level.</a:t>
+                      </a:r>
+                    </a:p>
+                    <a:p>
+                      <a:pPr marL="0" marR="0" lvl="0" indent="0" algn="l" defTabSz="966788" rtl="0" eaLnBrk="1" fontAlgn="base" latinLnBrk="0" hangingPunct="1">
+                        <a:lnSpc>
+                          <a:spcPct val="100000"/>
+                        </a:lnSpc>
+                        <a:spcBef>
+                          <a:spcPct val="5000"/>
+                        </a:spcBef>
+                        <a:spcAft>
+                          <a:spcPct val="0"/>
+                        </a:spcAft>
+                        <a:buClrTx/>
+                        <a:buSzTx/>
+                        <a:buFontTx/>
+                        <a:buNone/>
+                        <a:tabLst/>
+                      </a:pPr>
+                      <a:r>
+                        <a:rPr kumimoji="0" lang="en-US" sz="1100" b="0" i="0" u="none" strike="noStrike" cap="none" normalizeH="0" baseline="0" dirty="0">
+                          <a:ln>
+                            <a:noFill/>
+                          </a:ln>
+                          <a:solidFill>
+                            <a:schemeClr val="tx1"/>
+                          </a:solidFill>
+                          <a:effectLst/>
+                          <a:latin typeface="Arial" charset="0"/>
+                          <a:ea typeface="ＭＳ Ｐゴシック" pitchFamily="-112" charset="-128"/>
+                          <a:cs typeface="Times New Roman" pitchFamily="-112" charset="0"/>
+                        </a:rPr>
+                        <a:t>PCC stock on belt, muzzle pointed at cone. One shoe in each hand</a:t>
                       </a:r>
                     </a:p>
                   </a:txBody>
@@ -5178,96 +5307,6 @@
                         <a:t>Muzzle Safe Points: Muzzle safe markers / 180 degree rule</a:t>
                       </a:r>
                     </a:p>
-                    <a:p>
-                      <a:pPr marL="0" marR="0" lvl="0" indent="0" algn="l" defTabSz="966788" rtl="0" eaLnBrk="0" fontAlgn="base" latinLnBrk="0" hangingPunct="0">
-                        <a:lnSpc>
-                          <a:spcPct val="100000"/>
-                        </a:lnSpc>
-                        <a:spcBef>
-                          <a:spcPct val="0"/>
-                        </a:spcBef>
-                        <a:spcAft>
-                          <a:spcPct val="0"/>
-                        </a:spcAft>
-                        <a:buClrTx/>
-                        <a:buSzTx/>
-                        <a:buFontTx/>
-                        <a:buNone/>
-                        <a:tabLst/>
-                      </a:pPr>
-                      <a:endParaRPr kumimoji="0" lang="en-US" sz="1100" b="1" i="0" u="none" strike="noStrike" cap="none" normalizeH="0" baseline="0" dirty="0">
-                        <a:ln>
-                          <a:noFill/>
-                        </a:ln>
-                        <a:solidFill>
-                          <a:schemeClr val="tx1"/>
-                        </a:solidFill>
-                        <a:effectLst/>
-                        <a:latin typeface="Arial" charset="0"/>
-                        <a:ea typeface="ＭＳ Ｐゴシック" pitchFamily="-112" charset="-128"/>
-                        <a:cs typeface="Times New Roman" pitchFamily="-112" charset="0"/>
-                      </a:endParaRPr>
-                    </a:p>
-                    <a:p>
-                      <a:pPr marL="0" marR="0" lvl="0" indent="0" algn="l" defTabSz="966788" rtl="0" eaLnBrk="0" fontAlgn="base" latinLnBrk="0" hangingPunct="0">
-                        <a:lnSpc>
-                          <a:spcPct val="100000"/>
-                        </a:lnSpc>
-                        <a:spcBef>
-                          <a:spcPct val="0"/>
-                        </a:spcBef>
-                        <a:spcAft>
-                          <a:spcPct val="0"/>
-                        </a:spcAft>
-                        <a:buClrTx/>
-                        <a:buSzTx/>
-                        <a:buFontTx/>
-                        <a:buNone/>
-                        <a:tabLst/>
-                      </a:pPr>
-                      <a:r>
-                        <a:rPr kumimoji="0" lang="en-US" sz="1100" b="1" i="0" u="none" strike="noStrike" cap="none" normalizeH="0" baseline="0" dirty="0">
-                          <a:ln>
-                            <a:noFill/>
-                          </a:ln>
-                          <a:solidFill>
-                            <a:schemeClr val="tx1"/>
-                          </a:solidFill>
-                          <a:effectLst/>
-                          <a:latin typeface="Arial" charset="0"/>
-                          <a:ea typeface="ＭＳ Ｐゴシック" pitchFamily="-112" charset="-128"/>
-                          <a:cs typeface="Times New Roman" pitchFamily="-112" charset="0"/>
-                        </a:rPr>
-                        <a:t>SO NOTES: PCC start with stock on belt, muzzle pointing at cone. One shoe </a:t>
-                      </a:r>
-                      <a:r>
-                        <a:rPr kumimoji="0" lang="en-US" sz="1100" b="1" i="0" u="none" strike="noStrike" cap="none" normalizeH="0" baseline="0">
-                          <a:ln>
-                            <a:noFill/>
-                          </a:ln>
-                          <a:solidFill>
-                            <a:schemeClr val="tx1"/>
-                          </a:solidFill>
-                          <a:effectLst/>
-                          <a:latin typeface="Arial" charset="0"/>
-                          <a:ea typeface="ＭＳ Ｐゴシック" pitchFamily="-112" charset="-128"/>
-                          <a:cs typeface="Times New Roman" pitchFamily="-112" charset="0"/>
-                        </a:rPr>
-                        <a:t>in each hand.</a:t>
-                      </a:r>
-                      <a:endParaRPr kumimoji="0" lang="en-US" sz="1100" b="1" i="0" u="none" strike="noStrike" cap="none" normalizeH="0" baseline="0" dirty="0">
-                        <a:ln>
-                          <a:noFill/>
-                        </a:ln>
-                        <a:solidFill>
-                          <a:schemeClr val="tx1"/>
-                        </a:solidFill>
-                        <a:effectLst/>
-                        <a:latin typeface="Arial" charset="0"/>
-                        <a:ea typeface="ＭＳ Ｐゴシック" pitchFamily="-112" charset="-128"/>
-                        <a:cs typeface="Times New Roman" pitchFamily="-112" charset="0"/>
-                      </a:endParaRPr>
-                    </a:p>
                   </a:txBody>
                   <a:tcPr marL="45720" marR="45720" marT="45715" marB="45715" horzOverflow="overflow">
                     <a:lnL w="28575" cap="flat" cmpd="sng" algn="ctr">
@@ -5333,7 +5372,7 @@
                   </a:ext>
                 </a:extLst>
               </a:tr>
-              <a:tr h="1736192">
+              <a:tr h="980214">
                 <a:tc gridSpan="2">
                   <a:txBody>
                     <a:bodyPr/>
@@ -5368,58 +5407,10 @@
                           <a:ea typeface="ＭＳ Ｐゴシック" pitchFamily="-112" charset="-128"/>
                           <a:cs typeface="Times New Roman" pitchFamily="-112" charset="0"/>
                         </a:rPr>
-                        <a:t>STAGE PROCEDURE: At start signal, free up your hands, draw, and engage 7 threats with 2 rounds each from behind P1 and P2.</a:t>
+                        <a:t>STAGE PROCEDURE:</a:t>
                       </a:r>
-                    </a:p>
-                    <a:p>
-                      <a:pPr marL="0" marR="0" lvl="0" indent="0" algn="l" defTabSz="966788" rtl="0" eaLnBrk="1" fontAlgn="base" latinLnBrk="0" hangingPunct="1">
-                        <a:lnSpc>
-                          <a:spcPct val="100000"/>
-                        </a:lnSpc>
-                        <a:spcBef>
-                          <a:spcPct val="20000"/>
-                        </a:spcBef>
-                        <a:spcAft>
-                          <a:spcPct val="0"/>
-                        </a:spcAft>
-                        <a:buClrTx/>
-                        <a:buSzTx/>
-                        <a:buFontTx/>
-                        <a:buNone/>
-                        <a:tabLst/>
-                      </a:pPr>
-                      <a:endParaRPr kumimoji="0" lang="en-US" sz="1100" b="1" i="0" u="none" strike="noStrike" cap="none" normalizeH="0" baseline="0" dirty="0">
-                        <a:ln>
-                          <a:noFill/>
-                        </a:ln>
-                        <a:solidFill>
-                          <a:schemeClr val="tx1"/>
-                        </a:solidFill>
-                        <a:effectLst/>
-                        <a:latin typeface="Arial" charset="0"/>
-                        <a:ea typeface="ＭＳ Ｐゴシック" pitchFamily="-112" charset="-128"/>
-                        <a:cs typeface="Times New Roman" pitchFamily="-112" charset="0"/>
-                      </a:endParaRPr>
-                    </a:p>
-                    <a:p>
-                      <a:pPr marL="0" marR="0" lvl="0" indent="0" algn="l" defTabSz="966788" rtl="0" eaLnBrk="1" fontAlgn="base" latinLnBrk="0" hangingPunct="1">
-                        <a:lnSpc>
-                          <a:spcPct val="100000"/>
-                        </a:lnSpc>
-                        <a:spcBef>
-                          <a:spcPct val="20000"/>
-                        </a:spcBef>
-                        <a:spcAft>
-                          <a:spcPct val="0"/>
-                        </a:spcAft>
-                        <a:buClrTx/>
-                        <a:buSzTx/>
-                        <a:buFontTx/>
-                        <a:buNone/>
-                        <a:tabLst/>
-                      </a:pPr>
                       <a:r>
-                        <a:rPr kumimoji="0" lang="en-US" sz="1100" b="1" i="0" u="none" strike="noStrike" cap="none" normalizeH="0" baseline="0" dirty="0">
+                        <a:rPr kumimoji="0" lang="en-US" sz="1100" b="0" i="0" u="none" strike="noStrike" cap="none" normalizeH="0" baseline="0" dirty="0">
                           <a:ln>
                             <a:noFill/>
                           </a:ln>
@@ -5431,7 +5422,7 @@
                           <a:ea typeface="ＭＳ Ｐゴシック" pitchFamily="-112" charset="-128"/>
                           <a:cs typeface="Times New Roman" pitchFamily="-112" charset="0"/>
                         </a:rPr>
-                        <a:t>T1 –T4 must be engaged from P1. T5-7 must be engaged from P2.</a:t>
+                        <a:t> At start signal, engage targets from available cover with at least 2 shots</a:t>
                       </a:r>
                     </a:p>
                   </a:txBody>
@@ -5538,9 +5529,9 @@
           <p:nvPr/>
         </p:nvCxnSpPr>
         <p:spPr>
-          <a:xfrm flipH="1">
-            <a:off x="1844922" y="8051458"/>
-            <a:ext cx="596899" cy="0"/>
+          <a:xfrm>
+            <a:off x="1815780" y="7632177"/>
+            <a:ext cx="50005" cy="560841"/>
           </a:xfrm>
           <a:prstGeom prst="line">
             <a:avLst/>
@@ -5581,7 +5572,7 @@
         </p:nvSpPr>
         <p:spPr>
           <a:xfrm>
-            <a:off x="1930401" y="8159668"/>
+            <a:off x="1990130" y="7731468"/>
             <a:ext cx="533400" cy="369332"/>
           </a:xfrm>
           <a:prstGeom prst="rect">
@@ -5617,7 +5608,7 @@
         </p:nvSpPr>
         <p:spPr>
           <a:xfrm>
-            <a:off x="320437" y="4481178"/>
+            <a:off x="320437" y="4353641"/>
             <a:ext cx="533400" cy="369332"/>
           </a:xfrm>
           <a:prstGeom prst="rect">
@@ -5652,7 +5643,7 @@
         </p:nvGrpSpPr>
         <p:grpSpPr>
           <a:xfrm>
-            <a:off x="3442998" y="7160864"/>
+            <a:off x="3442998" y="7033327"/>
             <a:ext cx="685800" cy="587829"/>
             <a:chOff x="166468" y="7843451"/>
             <a:chExt cx="685800" cy="587829"/>
@@ -5979,7 +5970,7 @@
         </p:nvGrpSpPr>
         <p:grpSpPr bwMode="auto">
           <a:xfrm>
-            <a:off x="477467" y="4809218"/>
+            <a:off x="477467" y="4681681"/>
             <a:ext cx="287338" cy="790575"/>
             <a:chOff x="528" y="240"/>
             <a:chExt cx="181" cy="498"/>
@@ -6269,7 +6260,7 @@
         </p:nvGrpSpPr>
         <p:grpSpPr bwMode="auto">
           <a:xfrm>
-            <a:off x="712418" y="5334681"/>
+            <a:off x="712418" y="5207144"/>
             <a:ext cx="285750" cy="781050"/>
             <a:chOff x="2496" y="2112"/>
             <a:chExt cx="181" cy="499"/>
@@ -6676,7 +6667,7 @@
         </p:nvGrpSpPr>
         <p:grpSpPr bwMode="auto">
           <a:xfrm>
-            <a:off x="984037" y="5822067"/>
+            <a:off x="984037" y="5694530"/>
             <a:ext cx="287338" cy="787400"/>
             <a:chOff x="1756" y="2113"/>
             <a:chExt cx="181" cy="499"/>
@@ -7229,7 +7220,7 @@
         </p:nvGrpSpPr>
         <p:grpSpPr bwMode="auto">
           <a:xfrm>
-            <a:off x="1786732" y="4940981"/>
+            <a:off x="1786732" y="4813444"/>
             <a:ext cx="287338" cy="787400"/>
             <a:chOff x="2208" y="240"/>
             <a:chExt cx="181" cy="496"/>
@@ -7638,9 +7629,9 @@
           <p:nvPr/>
         </p:nvCxnSpPr>
         <p:spPr>
-          <a:xfrm flipH="1">
-            <a:off x="4324439" y="8089036"/>
-            <a:ext cx="596899" cy="0"/>
+          <a:xfrm flipV="1">
+            <a:off x="4965701" y="7731468"/>
+            <a:ext cx="1" cy="593342"/>
           </a:xfrm>
           <a:prstGeom prst="line">
             <a:avLst/>
@@ -7681,7 +7672,7 @@
         </p:nvSpPr>
         <p:spPr>
           <a:xfrm>
-            <a:off x="4409918" y="8197246"/>
+            <a:off x="4447968" y="7823325"/>
             <a:ext cx="533400" cy="369332"/>
           </a:xfrm>
           <a:prstGeom prst="rect">
@@ -7719,7 +7710,7 @@
         </p:nvSpPr>
         <p:spPr bwMode="auto">
           <a:xfrm>
-            <a:off x="4354355" y="6678656"/>
+            <a:off x="4354355" y="6551119"/>
             <a:ext cx="588963" cy="1212850"/>
           </a:xfrm>
           <a:prstGeom prst="rect">
@@ -7870,7 +7861,7 @@
         </p:nvGrpSpPr>
         <p:grpSpPr bwMode="auto">
           <a:xfrm>
-            <a:off x="2541566" y="4950595"/>
+            <a:off x="2541566" y="4823058"/>
             <a:ext cx="288925" cy="787400"/>
             <a:chOff x="1008" y="2592"/>
             <a:chExt cx="182" cy="496"/>
@@ -8303,7 +8294,7 @@
         </p:nvSpPr>
         <p:spPr bwMode="auto">
           <a:xfrm flipH="1">
-            <a:off x="2362199" y="6379995"/>
+            <a:off x="2362199" y="6252458"/>
             <a:ext cx="126323" cy="1352574"/>
           </a:xfrm>
           <a:custGeom>
@@ -8425,7 +8416,7 @@
         </p:nvSpPr>
         <p:spPr bwMode="auto">
           <a:xfrm>
-            <a:off x="4018172" y="5340104"/>
+            <a:off x="4018172" y="5212567"/>
             <a:ext cx="125574" cy="2236891"/>
           </a:xfrm>
           <a:custGeom>
@@ -8527,7 +8518,7 @@
         </p:nvSpPr>
         <p:spPr bwMode="auto">
           <a:xfrm flipH="1">
-            <a:off x="1802607" y="6342792"/>
+            <a:off x="1802607" y="6215255"/>
             <a:ext cx="258763" cy="1352574"/>
           </a:xfrm>
           <a:custGeom>
@@ -8629,7 +8620,7 @@
         </p:nvSpPr>
         <p:spPr bwMode="auto">
           <a:xfrm>
-            <a:off x="1802607" y="6506431"/>
+            <a:off x="1802607" y="6378894"/>
             <a:ext cx="685916" cy="1242262"/>
           </a:xfrm>
           <a:custGeom>
@@ -8731,7 +8722,7 @@
         </p:nvSpPr>
         <p:spPr>
           <a:xfrm>
-            <a:off x="4699001" y="4646007"/>
+            <a:off x="4699001" y="4518470"/>
             <a:ext cx="533400" cy="369332"/>
           </a:xfrm>
           <a:prstGeom prst="rect">
@@ -8766,7 +8757,7 @@
         </p:nvSpPr>
         <p:spPr>
           <a:xfrm>
-            <a:off x="1039366" y="5392795"/>
+            <a:off x="1039366" y="5265258"/>
             <a:ext cx="533400" cy="369332"/>
           </a:xfrm>
           <a:prstGeom prst="rect">
@@ -8801,7 +8792,7 @@
         </p:nvSpPr>
         <p:spPr>
           <a:xfrm>
-            <a:off x="2492007" y="4565139"/>
+            <a:off x="2492007" y="4437602"/>
             <a:ext cx="533400" cy="369332"/>
           </a:xfrm>
           <a:prstGeom prst="rect">
@@ -8838,7 +8829,7 @@
         </p:nvGrpSpPr>
         <p:grpSpPr bwMode="auto">
           <a:xfrm>
-            <a:off x="4799649" y="5098233"/>
+            <a:off x="4799649" y="4970696"/>
             <a:ext cx="287338" cy="787400"/>
             <a:chOff x="2449" y="2688"/>
             <a:chExt cx="181" cy="496"/>
@@ -9253,7 +9244,7 @@
         </p:nvGrpSpPr>
         <p:grpSpPr bwMode="auto">
           <a:xfrm>
-            <a:off x="5182589" y="5650858"/>
+            <a:off x="5182589" y="5523321"/>
             <a:ext cx="287338" cy="790575"/>
             <a:chOff x="528" y="240"/>
             <a:chExt cx="181" cy="498"/>
@@ -9543,7 +9534,7 @@
         </p:nvGrpSpPr>
         <p:grpSpPr bwMode="auto">
           <a:xfrm>
-            <a:off x="5062902" y="6260704"/>
+            <a:off x="5062902" y="6133167"/>
             <a:ext cx="285750" cy="781050"/>
             <a:chOff x="2496" y="2112"/>
             <a:chExt cx="181" cy="499"/>
@@ -9950,7 +9941,7 @@
         </p:nvGrpSpPr>
         <p:grpSpPr bwMode="auto">
           <a:xfrm>
-            <a:off x="5945400" y="6379995"/>
+            <a:off x="5945400" y="6252458"/>
             <a:ext cx="222250" cy="858838"/>
             <a:chOff x="384" y="816"/>
             <a:chExt cx="140" cy="541"/>
@@ -10238,7 +10229,7 @@
         </p:nvSpPr>
         <p:spPr>
           <a:xfrm>
-            <a:off x="5945400" y="5998241"/>
+            <a:off x="5945400" y="5870704"/>
             <a:ext cx="533400" cy="369332"/>
           </a:xfrm>
           <a:prstGeom prst="rect">
@@ -10273,7 +10264,7 @@
         </p:nvSpPr>
         <p:spPr>
           <a:xfrm>
-            <a:off x="1663701" y="4470937"/>
+            <a:off x="1663701" y="4343400"/>
             <a:ext cx="533400" cy="369332"/>
           </a:xfrm>
           <a:prstGeom prst="rect">
@@ -10308,7 +10299,7 @@
         </p:nvSpPr>
         <p:spPr>
           <a:xfrm>
-            <a:off x="5204198" y="5314780"/>
+            <a:off x="5204198" y="5187243"/>
             <a:ext cx="533400" cy="369332"/>
           </a:xfrm>
           <a:prstGeom prst="rect">
@@ -10329,6 +10320,50 @@
           </a:p>
         </p:txBody>
       </p:sp>
+      <p:cxnSp>
+        <p:nvCxnSpPr>
+          <p:cNvPr id="92" name="Straight Connector 91">
+            <a:extLst>
+              <a:ext uri="{FF2B5EF4-FFF2-40B4-BE49-F238E27FC236}">
+                <a16:creationId xmlns:a16="http://schemas.microsoft.com/office/drawing/2014/main" id="{CB1855E6-90CB-4E93-B627-3D37A4AFB373}"/>
+              </a:ext>
+            </a:extLst>
+          </p:cNvPr>
+          <p:cNvCxnSpPr>
+            <a:cxnSpLocks/>
+          </p:cNvCxnSpPr>
+          <p:nvPr/>
+        </p:nvCxnSpPr>
+        <p:spPr>
+          <a:xfrm>
+            <a:off x="2509024" y="7605032"/>
+            <a:ext cx="50005" cy="560841"/>
+          </a:xfrm>
+          <a:prstGeom prst="line">
+            <a:avLst/>
+          </a:prstGeom>
+          <a:ln>
+            <a:solidFill>
+              <a:srgbClr val="FF0000"/>
+            </a:solidFill>
+          </a:ln>
+          <a:effectLst/>
+        </p:spPr>
+        <p:style>
+          <a:lnRef idx="2">
+            <a:schemeClr val="accent1"/>
+          </a:lnRef>
+          <a:fillRef idx="0">
+            <a:schemeClr val="accent1"/>
+          </a:fillRef>
+          <a:effectRef idx="1">
+            <a:schemeClr val="accent1"/>
+          </a:effectRef>
+          <a:fontRef idx="minor">
+            <a:schemeClr val="tx1"/>
+          </a:fontRef>
+        </p:style>
+      </p:cxnSp>
     </p:spTree>
   </p:cSld>
   <p:clrMapOvr>

</xml_diff>